<commit_message>
Added some comments based on requirement gathering today
</commit_message>
<xml_diff>
--- a/user-requirements/reflectometry/NR Autoreduction.pptx
+++ b/user-requirements/reflectometry/NR Autoreduction.pptx
@@ -257,7 +257,7 @@
           <a:p>
             <a:fld id="{C718DA01-1D6C-4E7B-B570-A701516254F4}" type="datetimeFigureOut">
               <a:rPr lang="en-GB" smtClean="0"/>
-              <a:t>30/07/2020</a:t>
+              <a:t>20/01/2021</a:t>
             </a:fld>
             <a:endParaRPr lang="en-GB"/>
           </a:p>
@@ -427,7 +427,7 @@
           <a:p>
             <a:fld id="{C718DA01-1D6C-4E7B-B570-A701516254F4}" type="datetimeFigureOut">
               <a:rPr lang="en-GB" smtClean="0"/>
-              <a:t>30/07/2020</a:t>
+              <a:t>20/01/2021</a:t>
             </a:fld>
             <a:endParaRPr lang="en-GB"/>
           </a:p>
@@ -607,7 +607,7 @@
           <a:p>
             <a:fld id="{C718DA01-1D6C-4E7B-B570-A701516254F4}" type="datetimeFigureOut">
               <a:rPr lang="en-GB" smtClean="0"/>
-              <a:t>30/07/2020</a:t>
+              <a:t>20/01/2021</a:t>
             </a:fld>
             <a:endParaRPr lang="en-GB"/>
           </a:p>
@@ -777,7 +777,7 @@
           <a:p>
             <a:fld id="{C718DA01-1D6C-4E7B-B570-A701516254F4}" type="datetimeFigureOut">
               <a:rPr lang="en-GB" smtClean="0"/>
-              <a:t>30/07/2020</a:t>
+              <a:t>20/01/2021</a:t>
             </a:fld>
             <a:endParaRPr lang="en-GB"/>
           </a:p>
@@ -1023,7 +1023,7 @@
           <a:p>
             <a:fld id="{C718DA01-1D6C-4E7B-B570-A701516254F4}" type="datetimeFigureOut">
               <a:rPr lang="en-GB" smtClean="0"/>
-              <a:t>30/07/2020</a:t>
+              <a:t>20/01/2021</a:t>
             </a:fld>
             <a:endParaRPr lang="en-GB"/>
           </a:p>
@@ -1255,7 +1255,7 @@
           <a:p>
             <a:fld id="{C718DA01-1D6C-4E7B-B570-A701516254F4}" type="datetimeFigureOut">
               <a:rPr lang="en-GB" smtClean="0"/>
-              <a:t>30/07/2020</a:t>
+              <a:t>20/01/2021</a:t>
             </a:fld>
             <a:endParaRPr lang="en-GB"/>
           </a:p>
@@ -1622,7 +1622,7 @@
           <a:p>
             <a:fld id="{C718DA01-1D6C-4E7B-B570-A701516254F4}" type="datetimeFigureOut">
               <a:rPr lang="en-GB" smtClean="0"/>
-              <a:t>30/07/2020</a:t>
+              <a:t>20/01/2021</a:t>
             </a:fld>
             <a:endParaRPr lang="en-GB"/>
           </a:p>
@@ -1740,7 +1740,7 @@
           <a:p>
             <a:fld id="{C718DA01-1D6C-4E7B-B570-A701516254F4}" type="datetimeFigureOut">
               <a:rPr lang="en-GB" smtClean="0"/>
-              <a:t>30/07/2020</a:t>
+              <a:t>20/01/2021</a:t>
             </a:fld>
             <a:endParaRPr lang="en-GB"/>
           </a:p>
@@ -1835,7 +1835,7 @@
           <a:p>
             <a:fld id="{C718DA01-1D6C-4E7B-B570-A701516254F4}" type="datetimeFigureOut">
               <a:rPr lang="en-GB" smtClean="0"/>
-              <a:t>30/07/2020</a:t>
+              <a:t>20/01/2021</a:t>
             </a:fld>
             <a:endParaRPr lang="en-GB"/>
           </a:p>
@@ -2112,7 +2112,7 @@
           <a:p>
             <a:fld id="{C718DA01-1D6C-4E7B-B570-A701516254F4}" type="datetimeFigureOut">
               <a:rPr lang="en-GB" smtClean="0"/>
-              <a:t>30/07/2020</a:t>
+              <a:t>20/01/2021</a:t>
             </a:fld>
             <a:endParaRPr lang="en-GB"/>
           </a:p>
@@ -2365,7 +2365,7 @@
           <a:p>
             <a:fld id="{C718DA01-1D6C-4E7B-B570-A701516254F4}" type="datetimeFigureOut">
               <a:rPr lang="en-GB" smtClean="0"/>
-              <a:t>30/07/2020</a:t>
+              <a:t>20/01/2021</a:t>
             </a:fld>
             <a:endParaRPr lang="en-GB"/>
           </a:p>
@@ -2578,7 +2578,7 @@
           <a:p>
             <a:fld id="{C718DA01-1D6C-4E7B-B570-A701516254F4}" type="datetimeFigureOut">
               <a:rPr lang="en-GB" smtClean="0"/>
-              <a:t>30/07/2020</a:t>
+              <a:t>20/01/2021</a:t>
             </a:fld>
             <a:endParaRPr lang="en-GB"/>
           </a:p>
@@ -3025,19 +3025,27 @@
           <a:p>
             <a:r>
               <a:rPr lang="en-GB" dirty="0" smtClean="0"/>
-              <a:t>Transmission and corresponding run range must be defined in advance of the reduction taking place</a:t>
+              <a:t>Transmission and corresponding run range must be defined in advance of the reduction taking place (typically need changing per RB number)</a:t>
             </a:r>
           </a:p>
           <a:p>
             <a:r>
               <a:rPr lang="en-GB" dirty="0" smtClean="0"/>
-              <a:t>Flood file must be defined in advance</a:t>
+              <a:t>Flood file must be defined in advance (typically need changing per cycle)</a:t>
             </a:r>
           </a:p>
           <a:p>
             <a:r>
               <a:rPr lang="en-GB" dirty="0" smtClean="0"/>
-              <a:t>Optionally define polarisation correction runs</a:t>
+              <a:t>Optionally define polarisation correction runs (typically need </a:t>
+            </a:r>
+            <a:r>
+              <a:rPr lang="en-GB" dirty="0" smtClean="0"/>
+              <a:t>changing </a:t>
+            </a:r>
+            <a:r>
+              <a:rPr lang="en-GB" dirty="0" smtClean="0"/>
+              <a:t>per cycle)</a:t>
             </a:r>
           </a:p>
           <a:p>
@@ -6834,11 +6842,7 @@
             <a:pPr algn="ctr"/>
             <a:r>
               <a:rPr lang="en-GB" sz="1400" dirty="0" smtClean="0"/>
-              <a:t>Stitch </a:t>
-            </a:r>
-            <a:r>
-              <a:rPr lang="en-GB" sz="1400" dirty="0" smtClean="0"/>
-              <a:t>transmission and store in </a:t>
+              <a:t>Stitch transmission and store in </a:t>
             </a:r>
             <a:r>
               <a:rPr lang="en-GB" sz="1400" dirty="0" err="1" smtClean="0"/>
@@ -20208,15 +20212,15 @@
 <file path=customXml/itemProps2.xml><?xml version="1.0" encoding="utf-8"?>
 <ds:datastoreItem xmlns:ds="http://schemas.openxmlformats.org/officeDocument/2006/customXml" ds:itemID="{815D2EDD-E6F9-46E3-8A51-90728638D59B}">
   <ds:schemaRefs>
-    <ds:schemaRef ds:uri="http://purl.org/dc/terms/"/>
-    <ds:schemaRef ds:uri="79871994-9785-467e-8455-4c131891a602"/>
-    <ds:schemaRef ds:uri="http://purl.org/dc/dcmitype/"/>
-    <ds:schemaRef ds:uri="http://schemas.microsoft.com/office/2006/documentManagement/types"/>
     <ds:schemaRef ds:uri="http://purl.org/dc/elements/1.1/"/>
     <ds:schemaRef ds:uri="http://schemas.microsoft.com/office/2006/metadata/properties"/>
     <ds:schemaRef ds:uri="11c0c790-c135-4ba8-a058-4e25f49cd667"/>
+    <ds:schemaRef ds:uri="http://purl.org/dc/terms/"/>
+    <ds:schemaRef ds:uri="http://schemas.microsoft.com/office/2006/documentManagement/types"/>
+    <ds:schemaRef ds:uri="http://purl.org/dc/dcmitype/"/>
     <ds:schemaRef ds:uri="http://schemas.microsoft.com/office/infopath/2007/PartnerControls"/>
     <ds:schemaRef ds:uri="http://schemas.openxmlformats.org/package/2006/metadata/core-properties"/>
+    <ds:schemaRef ds:uri="79871994-9785-467e-8455-4c131891a602"/>
     <ds:schemaRef ds:uri="http://www.w3.org/XML/1998/namespace"/>
   </ds:schemaRefs>
 </ds:datastoreItem>

</xml_diff>